<commit_message>
:movie_camera: Did you know #4
</commit_message>
<xml_diff>
--- a/InProgress/DidYouKnow/DYKBanner.pptx
+++ b/InProgress/DidYouKnow/DYKBanner.pptx
@@ -291,7 +291,7 @@
                 <a:latin typeface="Arial"/>
                 <a:cs typeface="Arial"/>
               </a:rPr>
-              <a:t>5/9/2018</a:t>
+              <a:t>5/14/2018</a:t>
             </a:fld>
             <a:endParaRPr lang="en-US">
               <a:latin typeface="Arial"/>
@@ -476,7 +476,7 @@
             <a:fld id="{73B26A0F-F4D6-9B4F-A87B-D8948CDE3BB4}" type="datetimeFigureOut">
               <a:rPr lang="en-US" smtClean="0"/>
               <a:pPr/>
-              <a:t>5/9/2018</a:t>
+              <a:t>5/14/2018</a:t>
             </a:fld>
             <a:endParaRPr lang="en-US"/>
           </a:p>
@@ -4024,7 +4024,7 @@
                   <a:spcPct val="50000"/>
                 </a:spcBef>
               </a:pPr>
-              <a:t>May 9, 2018</a:t>
+              <a:t>May 14, 2018</a:t>
             </a:fld>
             <a:endParaRPr lang="en-US" sz="1100" b="0" dirty="0">
               <a:solidFill>
@@ -5777,7 +5777,7 @@
                   <a:spcPct val="50000"/>
                 </a:spcBef>
               </a:pPr>
-              <a:t>May 9, 2018</a:t>
+              <a:t>May 14, 2018</a:t>
             </a:fld>
             <a:endParaRPr lang="en-US" sz="1100" b="0" dirty="0">
               <a:solidFill>
@@ -7248,7 +7248,7 @@
                   <a:spcPct val="50000"/>
                 </a:spcBef>
               </a:pPr>
-              <a:t>May 9, 2018</a:t>
+              <a:t>May 14, 2018</a:t>
             </a:fld>
             <a:endParaRPr lang="en-US" sz="1100" b="0" dirty="0">
               <a:solidFill>
@@ -8601,7 +8601,7 @@
                   <a:spcPts val="0"/>
                 </a:spcBef>
               </a:pPr>
-              <a:t>May 9, 2018</a:t>
+              <a:t>May 14, 2018</a:t>
             </a:fld>
             <a:endParaRPr lang="en-US" sz="1100" b="0" dirty="0">
               <a:solidFill>
@@ -10038,7 +10038,7 @@
                   <a:spcPct val="50000"/>
                 </a:spcBef>
               </a:pPr>
-              <a:t>May 9, 2018</a:t>
+              <a:t>May 14, 2018</a:t>
             </a:fld>
             <a:endParaRPr lang="en-US" sz="1100" b="0" dirty="0">
               <a:solidFill>
@@ -13294,7 +13294,7 @@
                   <a:spcPts val="0"/>
                 </a:spcBef>
               </a:pPr>
-              <a:t>May 9, 2018</a:t>
+              <a:t>May 14, 2018</a:t>
             </a:fld>
             <a:endParaRPr lang="en-US" sz="1400" b="0" dirty="0">
               <a:solidFill>
@@ -14685,7 +14685,7 @@
                   <a:spcPts val="0"/>
                 </a:spcBef>
               </a:pPr>
-              <a:t>May 9, 2018</a:t>
+              <a:t>May 14, 2018</a:t>
             </a:fld>
             <a:endParaRPr lang="en-US" sz="1400" b="0" dirty="0">
               <a:solidFill>
@@ -16246,7 +16246,7 @@
                   <a:spcPts val="0"/>
                 </a:spcBef>
               </a:pPr>
-              <a:t>May 9, 2018</a:t>
+              <a:t>May 14, 2018</a:t>
             </a:fld>
             <a:endParaRPr lang="en-US" sz="1400" b="0" dirty="0">
               <a:solidFill>
@@ -17668,7 +17668,7 @@
                   <a:spcPts val="0"/>
                 </a:spcBef>
               </a:pPr>
-              <a:t>May 9, 2018</a:t>
+              <a:t>May 14, 2018</a:t>
             </a:fld>
             <a:endParaRPr lang="en-US" sz="1400" b="0" dirty="0">
               <a:solidFill>
@@ -19082,7 +19082,7 @@
                   <a:spcPts val="0"/>
                 </a:spcBef>
               </a:pPr>
-              <a:t>May 9, 2018</a:t>
+              <a:t>May 14, 2018</a:t>
             </a:fld>
             <a:endParaRPr lang="en-US" sz="1400" b="0" dirty="0">
               <a:solidFill>
@@ -21043,7 +21043,7 @@
           <a:p>
             <a:r>
               <a:rPr lang="en-US" dirty="0"/>
-              <a:t>#4 Using a workspace</a:t>
+              <a:t>#4 Learn more…</a:t>
             </a:r>
             <a:endParaRPr lang="en-GB" dirty="0"/>
           </a:p>

</xml_diff>